<commit_message>
New class ControlPanel. Score reset bug fixed. All status merged into one enum.
</commit_message>
<xml_diff>
--- a/Script Flow.pptx
+++ b/Script Flow.pptx
@@ -3451,7 +3451,7 @@
         </p:nvSpPr>
         <p:spPr>
           <a:xfrm>
-            <a:off x="4122428" y="4814022"/>
+            <a:off x="1802591" y="5824783"/>
             <a:ext cx="1586333" cy="659803"/>
           </a:xfrm>
           <a:prstGeom prst="ellipse">
@@ -3459,17 +3459,17 @@
           </a:prstGeom>
         </p:spPr>
         <p:style>
-          <a:lnRef idx="3">
-            <a:schemeClr val="lt1"/>
+          <a:lnRef idx="1">
+            <a:schemeClr val="accent2"/>
           </a:lnRef>
-          <a:fillRef idx="1">
+          <a:fillRef idx="2">
             <a:schemeClr val="accent2"/>
           </a:fillRef>
           <a:effectRef idx="1">
             <a:schemeClr val="accent2"/>
           </a:effectRef>
           <a:fontRef idx="minor">
-            <a:schemeClr val="lt1"/>
+            <a:schemeClr val="dk1"/>
           </a:fontRef>
         </p:style>
         <p:txBody>
@@ -3729,13 +3729,16 @@
       <p:cxnSp>
         <p:nvCxnSpPr>
           <p:cNvPr id="43" name="Straight Arrow Connector 42"/>
-          <p:cNvCxnSpPr/>
+          <p:cNvCxnSpPr>
+            <a:stCxn id="29" idx="6"/>
+            <a:endCxn id="30" idx="2"/>
+          </p:cNvCxnSpPr>
           <p:nvPr/>
         </p:nvCxnSpPr>
         <p:spPr>
-          <a:xfrm>
-            <a:off x="4935524" y="5492160"/>
-            <a:ext cx="0" cy="350958"/>
+          <a:xfrm flipV="1">
+            <a:off x="3388924" y="6154684"/>
+            <a:ext cx="733504" cy="1"/>
           </a:xfrm>
           <a:prstGeom prst="straightConnector1">
             <a:avLst/>
@@ -4005,7 +4008,6 @@
               <a:rPr lang="pt-BR" sz="1492" dirty="0"/>
               <a:t>Game Base</a:t>
             </a:r>
-            <a:endParaRPr lang="pt-BR" sz="1492" dirty="0"/>
           </a:p>
         </p:txBody>
       </p:sp>
@@ -4116,7 +4118,7 @@
         </p:nvSpPr>
         <p:spPr>
           <a:xfrm>
-            <a:off x="4122428" y="5843117"/>
+            <a:off x="4122428" y="5824782"/>
             <a:ext cx="1586333" cy="659803"/>
           </a:xfrm>
           <a:prstGeom prst="ellipse">
@@ -4124,14 +4126,16 @@
           </a:prstGeom>
         </p:spPr>
         <p:style>
-          <a:lnRef idx="3">
-            <a:schemeClr val="lt1"/>
+          <a:lnRef idx="2">
+            <a:schemeClr val="accent4">
+              <a:shade val="50000"/>
+            </a:schemeClr>
           </a:lnRef>
           <a:fillRef idx="1">
-            <a:schemeClr val="accent2"/>
+            <a:schemeClr val="accent4"/>
           </a:fillRef>
-          <a:effectRef idx="1">
-            <a:schemeClr val="accent2"/>
+          <a:effectRef idx="0">
+            <a:schemeClr val="accent4"/>
           </a:effectRef>
           <a:fontRef idx="minor">
             <a:schemeClr val="lt1"/>
@@ -4159,13 +4163,16 @@
       <p:cxnSp>
         <p:nvCxnSpPr>
           <p:cNvPr id="32" name="Straight Arrow Connector 31"/>
-          <p:cNvCxnSpPr/>
+          <p:cNvCxnSpPr>
+            <a:stCxn id="29" idx="0"/>
+            <a:endCxn id="22" idx="4"/>
+          </p:cNvCxnSpPr>
           <p:nvPr/>
         </p:nvCxnSpPr>
         <p:spPr>
-          <a:xfrm flipH="1">
-            <a:off x="3378395" y="5146623"/>
-            <a:ext cx="744033" cy="0"/>
+          <a:xfrm flipH="1" flipV="1">
+            <a:off x="2585229" y="5473825"/>
+            <a:ext cx="10529" cy="350958"/>
           </a:xfrm>
           <a:prstGeom prst="straightConnector1">
             <a:avLst/>
@@ -4233,6 +4240,176 @@
           </a:fontRef>
         </p:style>
       </p:cxnSp>
+      <p:sp>
+        <p:nvSpPr>
+          <p:cNvPr id="38" name="Oval 37"/>
+          <p:cNvSpPr/>
+          <p:nvPr/>
+        </p:nvSpPr>
+        <p:spPr>
+          <a:xfrm>
+            <a:off x="4122428" y="4826096"/>
+            <a:ext cx="1586333" cy="659803"/>
+          </a:xfrm>
+          <a:prstGeom prst="ellipse">
+            <a:avLst/>
+          </a:prstGeom>
+        </p:spPr>
+        <p:style>
+          <a:lnRef idx="1">
+            <a:schemeClr val="accent2"/>
+          </a:lnRef>
+          <a:fillRef idx="2">
+            <a:schemeClr val="accent2"/>
+          </a:fillRef>
+          <a:effectRef idx="1">
+            <a:schemeClr val="accent2"/>
+          </a:effectRef>
+          <a:fontRef idx="minor">
+            <a:schemeClr val="dk1"/>
+          </a:fontRef>
+        </p:style>
+        <p:txBody>
+          <a:bodyPr rtlCol="0" anchor="ctr"/>
+          <a:lstStyle/>
+          <a:p>
+            <a:pPr algn="ctr"/>
+            <a:r>
+              <a:rPr lang="pt-BR" sz="1492" dirty="0" smtClean="0"/>
+              <a:t>Results Panel</a:t>
+            </a:r>
+            <a:endParaRPr lang="pt-BR" sz="1492" dirty="0"/>
+          </a:p>
+        </p:txBody>
+      </p:sp>
+      <p:cxnSp>
+        <p:nvCxnSpPr>
+          <p:cNvPr id="40" name="Straight Arrow Connector 39"/>
+          <p:cNvCxnSpPr>
+            <a:stCxn id="38" idx="2"/>
+            <a:endCxn id="22" idx="6"/>
+          </p:cNvCxnSpPr>
+          <p:nvPr/>
+        </p:nvCxnSpPr>
+        <p:spPr>
+          <a:xfrm flipH="1" flipV="1">
+            <a:off x="3378395" y="5143924"/>
+            <a:ext cx="744033" cy="12074"/>
+          </a:xfrm>
+          <a:prstGeom prst="straightConnector1">
+            <a:avLst/>
+          </a:prstGeom>
+          <a:ln w="38100">
+            <a:solidFill>
+              <a:schemeClr val="tx1"/>
+            </a:solidFill>
+            <a:tailEnd type="triangle"/>
+          </a:ln>
+        </p:spPr>
+        <p:style>
+          <a:lnRef idx="1">
+            <a:schemeClr val="accent1"/>
+          </a:lnRef>
+          <a:fillRef idx="0">
+            <a:schemeClr val="accent1"/>
+          </a:fillRef>
+          <a:effectRef idx="0">
+            <a:schemeClr val="accent1"/>
+          </a:effectRef>
+          <a:fontRef idx="minor">
+            <a:schemeClr val="tx1"/>
+          </a:fontRef>
+        </p:style>
+      </p:cxnSp>
+      <p:cxnSp>
+        <p:nvCxnSpPr>
+          <p:cNvPr id="44" name="Straight Arrow Connector 43"/>
+          <p:cNvCxnSpPr>
+            <a:stCxn id="26" idx="4"/>
+            <a:endCxn id="38" idx="0"/>
+          </p:cNvCxnSpPr>
+          <p:nvPr/>
+        </p:nvCxnSpPr>
+        <p:spPr>
+          <a:xfrm>
+            <a:off x="4915595" y="4463064"/>
+            <a:ext cx="0" cy="363032"/>
+          </a:xfrm>
+          <a:prstGeom prst="straightConnector1">
+            <a:avLst/>
+          </a:prstGeom>
+          <a:ln w="38100">
+            <a:solidFill>
+              <a:schemeClr val="tx1"/>
+            </a:solidFill>
+            <a:tailEnd type="triangle"/>
+          </a:ln>
+        </p:spPr>
+        <p:style>
+          <a:lnRef idx="1">
+            <a:schemeClr val="accent1"/>
+          </a:lnRef>
+          <a:fillRef idx="0">
+            <a:schemeClr val="accent1"/>
+          </a:fillRef>
+          <a:effectRef idx="0">
+            <a:schemeClr val="accent1"/>
+          </a:effectRef>
+          <a:fontRef idx="minor">
+            <a:schemeClr val="tx1"/>
+          </a:fontRef>
+        </p:style>
+      </p:cxnSp>
+      <p:sp>
+        <p:nvSpPr>
+          <p:cNvPr id="45" name="Oval 44"/>
+          <p:cNvSpPr/>
+          <p:nvPr/>
+        </p:nvSpPr>
+        <p:spPr>
+          <a:xfrm>
+            <a:off x="3561574" y="7478068"/>
+            <a:ext cx="1586333" cy="659803"/>
+          </a:xfrm>
+          <a:prstGeom prst="ellipse">
+            <a:avLst/>
+          </a:prstGeom>
+        </p:spPr>
+        <p:style>
+          <a:lnRef idx="1">
+            <a:schemeClr val="accent2"/>
+          </a:lnRef>
+          <a:fillRef idx="2">
+            <a:schemeClr val="accent2"/>
+          </a:fillRef>
+          <a:effectRef idx="1">
+            <a:schemeClr val="accent2"/>
+          </a:effectRef>
+          <a:fontRef idx="minor">
+            <a:schemeClr val="dk1"/>
+          </a:fontRef>
+        </p:style>
+        <p:txBody>
+          <a:bodyPr rtlCol="0" anchor="ctr"/>
+          <a:lstStyle/>
+          <a:p>
+            <a:pPr algn="ctr"/>
+            <a:r>
+              <a:rPr lang="pt-BR" sz="1492" smtClean="0"/>
+              <a:t>Results</a:t>
+            </a:r>
+            <a:endParaRPr lang="pt-BR" sz="1492" dirty="0"/>
+          </a:p>
+          <a:p>
+            <a:pPr algn="ctr"/>
+            <a:r>
+              <a:rPr lang="pt-BR" sz="1492" dirty="0" smtClean="0"/>
+              <a:t>Panel</a:t>
+            </a:r>
+            <a:endParaRPr lang="pt-BR" sz="1492" dirty="0"/>
+          </a:p>
+        </p:txBody>
+      </p:sp>
     </p:spTree>
     <p:extLst>
       <p:ext uri="{BB962C8B-B14F-4D97-AF65-F5344CB8AC3E}">

</xml_diff>

<commit_message>
Robot input added to Control Manager. Connection added to Control Panel.
</commit_message>
<xml_diff>
--- a/Script Flow.pptx
+++ b/Script Flow.pptx
@@ -243,7 +243,7 @@
           <a:p>
             <a:fld id="{2E538E35-4A08-48D2-89A5-89C6CF66D327}" type="datetimeFigureOut">
               <a:rPr lang="pt-BR" smtClean="0"/>
-              <a:t>26/04/2017</a:t>
+              <a:t>30/04/2017</a:t>
             </a:fld>
             <a:endParaRPr lang="pt-BR"/>
           </a:p>
@@ -413,7 +413,7 @@
           <a:p>
             <a:fld id="{2E538E35-4A08-48D2-89A5-89C6CF66D327}" type="datetimeFigureOut">
               <a:rPr lang="pt-BR" smtClean="0"/>
-              <a:t>26/04/2017</a:t>
+              <a:t>30/04/2017</a:t>
             </a:fld>
             <a:endParaRPr lang="pt-BR"/>
           </a:p>
@@ -593,7 +593,7 @@
           <a:p>
             <a:fld id="{2E538E35-4A08-48D2-89A5-89C6CF66D327}" type="datetimeFigureOut">
               <a:rPr lang="pt-BR" smtClean="0"/>
-              <a:t>26/04/2017</a:t>
+              <a:t>30/04/2017</a:t>
             </a:fld>
             <a:endParaRPr lang="pt-BR"/>
           </a:p>
@@ -763,7 +763,7 @@
           <a:p>
             <a:fld id="{2E538E35-4A08-48D2-89A5-89C6CF66D327}" type="datetimeFigureOut">
               <a:rPr lang="pt-BR" smtClean="0"/>
-              <a:t>26/04/2017</a:t>
+              <a:t>30/04/2017</a:t>
             </a:fld>
             <a:endParaRPr lang="pt-BR"/>
           </a:p>
@@ -1007,7 +1007,7 @@
           <a:p>
             <a:fld id="{2E538E35-4A08-48D2-89A5-89C6CF66D327}" type="datetimeFigureOut">
               <a:rPr lang="pt-BR" smtClean="0"/>
-              <a:t>26/04/2017</a:t>
+              <a:t>30/04/2017</a:t>
             </a:fld>
             <a:endParaRPr lang="pt-BR"/>
           </a:p>
@@ -1239,7 +1239,7 @@
           <a:p>
             <a:fld id="{2E538E35-4A08-48D2-89A5-89C6CF66D327}" type="datetimeFigureOut">
               <a:rPr lang="pt-BR" smtClean="0"/>
-              <a:t>26/04/2017</a:t>
+              <a:t>30/04/2017</a:t>
             </a:fld>
             <a:endParaRPr lang="pt-BR"/>
           </a:p>
@@ -1606,7 +1606,7 @@
           <a:p>
             <a:fld id="{2E538E35-4A08-48D2-89A5-89C6CF66D327}" type="datetimeFigureOut">
               <a:rPr lang="pt-BR" smtClean="0"/>
-              <a:t>26/04/2017</a:t>
+              <a:t>30/04/2017</a:t>
             </a:fld>
             <a:endParaRPr lang="pt-BR"/>
           </a:p>
@@ -1724,7 +1724,7 @@
           <a:p>
             <a:fld id="{2E538E35-4A08-48D2-89A5-89C6CF66D327}" type="datetimeFigureOut">
               <a:rPr lang="pt-BR" smtClean="0"/>
-              <a:t>26/04/2017</a:t>
+              <a:t>30/04/2017</a:t>
             </a:fld>
             <a:endParaRPr lang="pt-BR"/>
           </a:p>
@@ -1819,7 +1819,7 @@
           <a:p>
             <a:fld id="{2E538E35-4A08-48D2-89A5-89C6CF66D327}" type="datetimeFigureOut">
               <a:rPr lang="pt-BR" smtClean="0"/>
-              <a:t>26/04/2017</a:t>
+              <a:t>30/04/2017</a:t>
             </a:fld>
             <a:endParaRPr lang="pt-BR"/>
           </a:p>
@@ -2096,7 +2096,7 @@
           <a:p>
             <a:fld id="{2E538E35-4A08-48D2-89A5-89C6CF66D327}" type="datetimeFigureOut">
               <a:rPr lang="pt-BR" smtClean="0"/>
-              <a:t>26/04/2017</a:t>
+              <a:t>30/04/2017</a:t>
             </a:fld>
             <a:endParaRPr lang="pt-BR"/>
           </a:p>
@@ -2353,7 +2353,7 @@
           <a:p>
             <a:fld id="{2E538E35-4A08-48D2-89A5-89C6CF66D327}" type="datetimeFigureOut">
               <a:rPr lang="pt-BR" smtClean="0"/>
-              <a:t>26/04/2017</a:t>
+              <a:t>30/04/2017</a:t>
             </a:fld>
             <a:endParaRPr lang="pt-BR"/>
           </a:p>
@@ -2566,7 +2566,7 @@
           <a:p>
             <a:fld id="{2E538E35-4A08-48D2-89A5-89C6CF66D327}" type="datetimeFigureOut">
               <a:rPr lang="pt-BR" smtClean="0"/>
-              <a:t>26/04/2017</a:t>
+              <a:t>30/04/2017</a:t>
             </a:fld>
             <a:endParaRPr lang="pt-BR"/>
           </a:p>
@@ -2980,7 +2980,7 @@
         <p:spPr>
           <a:xfrm>
             <a:off x="3947628" y="1771096"/>
-            <a:ext cx="1944312" cy="2920416"/>
+            <a:ext cx="2084368" cy="2920416"/>
           </a:xfrm>
           <a:prstGeom prst="rect">
             <a:avLst/>
@@ -3410,7 +3410,7 @@
         </p:nvSpPr>
         <p:spPr>
           <a:xfrm>
-            <a:off x="6452793" y="4814021"/>
+            <a:off x="6452792" y="448733"/>
             <a:ext cx="1586333" cy="659803"/>
           </a:xfrm>
           <a:prstGeom prst="ellipse">
@@ -3451,7 +3451,7 @@
         </p:nvSpPr>
         <p:spPr>
           <a:xfrm>
-            <a:off x="1802591" y="5824783"/>
+            <a:off x="1792061" y="5824783"/>
             <a:ext cx="1586333" cy="659803"/>
           </a:xfrm>
           <a:prstGeom prst="ellipse">
@@ -3730,15 +3730,15 @@
         <p:nvCxnSpPr>
           <p:cNvPr id="43" name="Straight Arrow Connector 42"/>
           <p:cNvCxnSpPr>
-            <a:stCxn id="29" idx="6"/>
-            <a:endCxn id="30" idx="2"/>
+            <a:stCxn id="29" idx="4"/>
+            <a:endCxn id="30" idx="0"/>
           </p:cNvCxnSpPr>
           <p:nvPr/>
         </p:nvCxnSpPr>
         <p:spPr>
-          <a:xfrm flipV="1">
-            <a:off x="3388924" y="6154684"/>
-            <a:ext cx="733504" cy="1"/>
+          <a:xfrm>
+            <a:off x="2585228" y="6484586"/>
+            <a:ext cx="0" cy="350958"/>
           </a:xfrm>
           <a:prstGeom prst="straightConnector1">
             <a:avLst/>
@@ -3773,8 +3773,8 @@
         </p:nvSpPr>
         <p:spPr>
           <a:xfrm rot="5400000">
-            <a:off x="6111358" y="3786054"/>
-            <a:ext cx="255379" cy="694218"/>
+            <a:off x="6187160" y="3861856"/>
+            <a:ext cx="243832" cy="554161"/>
           </a:xfrm>
           <a:prstGeom prst="downArrow">
             <a:avLst/>
@@ -4013,112 +4013,13 @@
       </p:sp>
       <p:sp>
         <p:nvSpPr>
-          <p:cNvPr id="61" name="Rectangle 60"/>
-          <p:cNvSpPr/>
-          <p:nvPr/>
-        </p:nvSpPr>
-        <p:spPr>
-          <a:xfrm>
-            <a:off x="6042525" y="4696889"/>
-            <a:ext cx="2374535" cy="918218"/>
-          </a:xfrm>
-          <a:prstGeom prst="rect">
-            <a:avLst/>
-          </a:prstGeom>
-          <a:noFill/>
-          <a:ln>
-            <a:solidFill>
-              <a:schemeClr val="bg1">
-                <a:lumMod val="50000"/>
-              </a:schemeClr>
-            </a:solidFill>
-            <a:prstDash val="dash"/>
-          </a:ln>
-        </p:spPr>
-        <p:style>
-          <a:lnRef idx="2">
-            <a:schemeClr val="accent1">
-              <a:shade val="50000"/>
-            </a:schemeClr>
-          </a:lnRef>
-          <a:fillRef idx="1">
-            <a:schemeClr val="accent1"/>
-          </a:fillRef>
-          <a:effectRef idx="0">
-            <a:schemeClr val="accent1"/>
-          </a:effectRef>
-          <a:fontRef idx="minor">
-            <a:schemeClr val="lt1"/>
-          </a:fontRef>
-        </p:style>
-        <p:txBody>
-          <a:bodyPr rtlCol="0" anchor="ctr"/>
-          <a:lstStyle/>
-          <a:p>
-            <a:pPr algn="ctr"/>
-            <a:endParaRPr lang="pt-BR" sz="1492"/>
-          </a:p>
-        </p:txBody>
-      </p:sp>
-      <p:sp>
-        <p:nvSpPr>
-          <p:cNvPr id="63" name="L-Shape 62"/>
-          <p:cNvSpPr/>
-          <p:nvPr/>
-        </p:nvSpPr>
-        <p:spPr>
-          <a:xfrm rot="5400000">
-            <a:off x="2340873" y="530353"/>
-            <a:ext cx="5159968" cy="6992405"/>
-          </a:xfrm>
-          <a:prstGeom prst="corner">
-            <a:avLst>
-              <a:gd name="adj1" fmla="val 88664"/>
-              <a:gd name="adj2" fmla="val 61739"/>
-            </a:avLst>
-          </a:prstGeom>
-          <a:noFill/>
-          <a:ln w="28575">
-            <a:solidFill>
-              <a:schemeClr val="tx1"/>
-            </a:solidFill>
-            <a:prstDash val="sysDash"/>
-          </a:ln>
-        </p:spPr>
-        <p:style>
-          <a:lnRef idx="2">
-            <a:schemeClr val="accent1">
-              <a:shade val="50000"/>
-            </a:schemeClr>
-          </a:lnRef>
-          <a:fillRef idx="1">
-            <a:schemeClr val="accent1"/>
-          </a:fillRef>
-          <a:effectRef idx="0">
-            <a:schemeClr val="accent1"/>
-          </a:effectRef>
-          <a:fontRef idx="minor">
-            <a:schemeClr val="lt1"/>
-          </a:fontRef>
-        </p:style>
-        <p:txBody>
-          <a:bodyPr rtlCol="0" anchor="ctr"/>
-          <a:lstStyle/>
-          <a:p>
-            <a:pPr algn="ctr"/>
-            <a:endParaRPr lang="pt-BR" sz="1492"/>
-          </a:p>
-        </p:txBody>
-      </p:sp>
-      <p:sp>
-        <p:nvSpPr>
           <p:cNvPr id="30" name="Oval 29"/>
           <p:cNvSpPr/>
           <p:nvPr/>
         </p:nvSpPr>
         <p:spPr>
           <a:xfrm>
-            <a:off x="4122428" y="5824782"/>
+            <a:off x="1792061" y="6835544"/>
             <a:ext cx="1586333" cy="659803"/>
           </a:xfrm>
           <a:prstGeom prst="ellipse">
@@ -4170,9 +4071,9 @@
           <p:nvPr/>
         </p:nvCxnSpPr>
         <p:spPr>
-          <a:xfrm flipH="1" flipV="1">
-            <a:off x="2585229" y="5473825"/>
-            <a:ext cx="10529" cy="350958"/>
+          <a:xfrm flipV="1">
+            <a:off x="2585228" y="5473825"/>
+            <a:ext cx="1" cy="350958"/>
           </a:xfrm>
           <a:prstGeom prst="straightConnector1">
             <a:avLst/>
@@ -4276,7 +4177,14 @@
             <a:pPr algn="ctr"/>
             <a:r>
               <a:rPr lang="pt-BR" sz="1492" dirty="0" smtClean="0"/>
-              <a:t>Results Panel</a:t>
+              <a:t>Control</a:t>
+            </a:r>
+          </a:p>
+          <a:p>
+            <a:pPr algn="ctr"/>
+            <a:r>
+              <a:rPr lang="pt-BR" sz="1492" dirty="0" smtClean="0"/>
+              <a:t>Panel</a:t>
             </a:r>
             <a:endParaRPr lang="pt-BR" sz="1492" dirty="0"/>
           </a:p>
@@ -4368,7 +4276,7 @@
         </p:nvSpPr>
         <p:spPr>
           <a:xfrm>
-            <a:off x="3561574" y="7478068"/>
+            <a:off x="6452791" y="4826095"/>
             <a:ext cx="1586333" cy="659803"/>
           </a:xfrm>
           <a:prstGeom prst="ellipse">
@@ -4410,6 +4318,429 @@
           </a:p>
         </p:txBody>
       </p:sp>
+      <p:cxnSp>
+        <p:nvCxnSpPr>
+          <p:cNvPr id="41" name="Elbow Connector 40"/>
+          <p:cNvCxnSpPr>
+            <a:stCxn id="38" idx="7"/>
+            <a:endCxn id="20" idx="6"/>
+          </p:cNvCxnSpPr>
+          <p:nvPr/>
+        </p:nvCxnSpPr>
+        <p:spPr>
+          <a:xfrm rot="5400000" flipH="1" flipV="1">
+            <a:off x="4187064" y="3401026"/>
+            <a:ext cx="2811081" cy="232313"/>
+          </a:xfrm>
+          <a:prstGeom prst="bentConnector4">
+            <a:avLst>
+              <a:gd name="adj1" fmla="val 978"/>
+              <a:gd name="adj2" fmla="val 198402"/>
+            </a:avLst>
+          </a:prstGeom>
+          <a:ln w="38100">
+            <a:solidFill>
+              <a:schemeClr val="bg1">
+                <a:lumMod val="50000"/>
+              </a:schemeClr>
+            </a:solidFill>
+            <a:tailEnd type="triangle"/>
+          </a:ln>
+        </p:spPr>
+        <p:style>
+          <a:lnRef idx="1">
+            <a:schemeClr val="accent1"/>
+          </a:lnRef>
+          <a:fillRef idx="0">
+            <a:schemeClr val="accent1"/>
+          </a:fillRef>
+          <a:effectRef idx="0">
+            <a:schemeClr val="accent1"/>
+          </a:effectRef>
+          <a:fontRef idx="minor">
+            <a:schemeClr val="tx1"/>
+          </a:fontRef>
+        </p:style>
+      </p:cxnSp>
+      <p:cxnSp>
+        <p:nvCxnSpPr>
+          <p:cNvPr id="50" name="Straight Arrow Connector 49"/>
+          <p:cNvCxnSpPr>
+            <a:stCxn id="38" idx="6"/>
+            <a:endCxn id="45" idx="2"/>
+          </p:cNvCxnSpPr>
+          <p:nvPr/>
+        </p:nvCxnSpPr>
+        <p:spPr>
+          <a:xfrm flipV="1">
+            <a:off x="5708761" y="5155997"/>
+            <a:ext cx="744030" cy="1"/>
+          </a:xfrm>
+          <a:prstGeom prst="straightConnector1">
+            <a:avLst/>
+          </a:prstGeom>
+          <a:ln w="38100">
+            <a:solidFill>
+              <a:schemeClr val="tx1"/>
+            </a:solidFill>
+            <a:tailEnd type="triangle"/>
+          </a:ln>
+        </p:spPr>
+        <p:style>
+          <a:lnRef idx="1">
+            <a:schemeClr val="accent1"/>
+          </a:lnRef>
+          <a:fillRef idx="0">
+            <a:schemeClr val="accent1"/>
+          </a:fillRef>
+          <a:effectRef idx="0">
+            <a:schemeClr val="accent1"/>
+          </a:effectRef>
+          <a:fontRef idx="minor">
+            <a:schemeClr val="tx1"/>
+          </a:fontRef>
+        </p:style>
+      </p:cxnSp>
+      <p:sp>
+        <p:nvSpPr>
+          <p:cNvPr id="36" name="Rectangle 35"/>
+          <p:cNvSpPr/>
+          <p:nvPr/>
+        </p:nvSpPr>
+        <p:spPr>
+          <a:xfrm>
+            <a:off x="1317171" y="1440796"/>
+            <a:ext cx="7032172" cy="6244518"/>
+          </a:xfrm>
+          <a:prstGeom prst="rect">
+            <a:avLst/>
+          </a:prstGeom>
+          <a:noFill/>
+          <a:ln w="28575">
+            <a:solidFill>
+              <a:schemeClr val="tx1"/>
+            </a:solidFill>
+            <a:prstDash val="dash"/>
+          </a:ln>
+        </p:spPr>
+        <p:style>
+          <a:lnRef idx="1">
+            <a:schemeClr val="dk1"/>
+          </a:lnRef>
+          <a:fillRef idx="2">
+            <a:schemeClr val="dk1"/>
+          </a:fillRef>
+          <a:effectRef idx="1">
+            <a:schemeClr val="dk1"/>
+          </a:effectRef>
+          <a:fontRef idx="minor">
+            <a:schemeClr val="dk1"/>
+          </a:fontRef>
+        </p:style>
+        <p:txBody>
+          <a:bodyPr rtlCol="0" anchor="ctr"/>
+          <a:lstStyle/>
+          <a:p>
+            <a:pPr algn="ctr"/>
+            <a:endParaRPr lang="pt-BR"/>
+          </a:p>
+        </p:txBody>
+      </p:sp>
+      <p:sp>
+        <p:nvSpPr>
+          <p:cNvPr id="54" name="Oval 53"/>
+          <p:cNvSpPr/>
+          <p:nvPr/>
+        </p:nvSpPr>
+        <p:spPr>
+          <a:xfrm>
+            <a:off x="4122427" y="6835544"/>
+            <a:ext cx="1586333" cy="659803"/>
+          </a:xfrm>
+          <a:prstGeom prst="ellipse">
+            <a:avLst/>
+          </a:prstGeom>
+        </p:spPr>
+        <p:style>
+          <a:lnRef idx="3">
+            <a:schemeClr val="lt1"/>
+          </a:lnRef>
+          <a:fillRef idx="1">
+            <a:schemeClr val="accent2"/>
+          </a:fillRef>
+          <a:effectRef idx="1">
+            <a:schemeClr val="accent2"/>
+          </a:effectRef>
+          <a:fontRef idx="minor">
+            <a:schemeClr val="lt1"/>
+          </a:fontRef>
+        </p:style>
+        <p:txBody>
+          <a:bodyPr rtlCol="0" anchor="ctr"/>
+          <a:lstStyle/>
+          <a:p>
+            <a:pPr algn="ctr"/>
+            <a:r>
+              <a:rPr lang="pt-BR" sz="1492" dirty="0" smtClean="0"/>
+              <a:t>Robot</a:t>
+            </a:r>
+          </a:p>
+          <a:p>
+            <a:pPr algn="ctr"/>
+            <a:r>
+              <a:rPr lang="pt-BR" sz="1492" dirty="0" smtClean="0"/>
+              <a:t>Cursor</a:t>
+            </a:r>
+            <a:endParaRPr lang="pt-BR" sz="1492" dirty="0"/>
+          </a:p>
+        </p:txBody>
+      </p:sp>
+      <p:sp>
+        <p:nvSpPr>
+          <p:cNvPr id="59" name="Oval 58"/>
+          <p:cNvSpPr/>
+          <p:nvPr/>
+        </p:nvSpPr>
+        <p:spPr>
+          <a:xfrm>
+            <a:off x="4122426" y="5845403"/>
+            <a:ext cx="1586333" cy="659803"/>
+          </a:xfrm>
+          <a:prstGeom prst="ellipse">
+            <a:avLst/>
+          </a:prstGeom>
+        </p:spPr>
+        <p:style>
+          <a:lnRef idx="3">
+            <a:schemeClr val="lt1"/>
+          </a:lnRef>
+          <a:fillRef idx="1">
+            <a:schemeClr val="accent2"/>
+          </a:fillRef>
+          <a:effectRef idx="1">
+            <a:schemeClr val="accent2"/>
+          </a:effectRef>
+          <a:fontRef idx="minor">
+            <a:schemeClr val="lt1"/>
+          </a:fontRef>
+        </p:style>
+        <p:txBody>
+          <a:bodyPr rtlCol="0" anchor="ctr"/>
+          <a:lstStyle/>
+          <a:p>
+            <a:pPr algn="ctr"/>
+            <a:r>
+              <a:rPr lang="pt-BR" sz="1492" dirty="0" smtClean="0"/>
+              <a:t>Connection</a:t>
+            </a:r>
+            <a:endParaRPr lang="pt-BR" sz="1492" dirty="0"/>
+          </a:p>
+        </p:txBody>
+      </p:sp>
+      <p:cxnSp>
+        <p:nvCxnSpPr>
+          <p:cNvPr id="62" name="Straight Arrow Connector 61"/>
+          <p:cNvCxnSpPr>
+            <a:stCxn id="38" idx="4"/>
+            <a:endCxn id="59" idx="0"/>
+          </p:cNvCxnSpPr>
+          <p:nvPr/>
+        </p:nvCxnSpPr>
+        <p:spPr>
+          <a:xfrm flipH="1">
+            <a:off x="4915593" y="5485899"/>
+            <a:ext cx="2" cy="359504"/>
+          </a:xfrm>
+          <a:prstGeom prst="straightConnector1">
+            <a:avLst/>
+          </a:prstGeom>
+          <a:ln w="38100">
+            <a:solidFill>
+              <a:schemeClr val="tx1"/>
+            </a:solidFill>
+            <a:tailEnd type="triangle"/>
+          </a:ln>
+        </p:spPr>
+        <p:style>
+          <a:lnRef idx="1">
+            <a:schemeClr val="accent1"/>
+          </a:lnRef>
+          <a:fillRef idx="0">
+            <a:schemeClr val="accent1"/>
+          </a:fillRef>
+          <a:effectRef idx="0">
+            <a:schemeClr val="accent1"/>
+          </a:effectRef>
+          <a:fontRef idx="minor">
+            <a:schemeClr val="tx1"/>
+          </a:fontRef>
+        </p:style>
+      </p:cxnSp>
+      <p:cxnSp>
+        <p:nvCxnSpPr>
+          <p:cNvPr id="65" name="Elbow Connector 64"/>
+          <p:cNvCxnSpPr>
+            <a:stCxn id="59" idx="6"/>
+            <a:endCxn id="20" idx="6"/>
+          </p:cNvCxnSpPr>
+          <p:nvPr/>
+        </p:nvCxnSpPr>
+        <p:spPr>
+          <a:xfrm flipV="1">
+            <a:off x="5708759" y="2111641"/>
+            <a:ext cx="2" cy="4063664"/>
+          </a:xfrm>
+          <a:prstGeom prst="bentConnector3">
+            <a:avLst>
+              <a:gd name="adj1" fmla="val 11430100000"/>
+            </a:avLst>
+          </a:prstGeom>
+          <a:ln w="38100">
+            <a:solidFill>
+              <a:schemeClr val="bg1">
+                <a:lumMod val="50000"/>
+              </a:schemeClr>
+            </a:solidFill>
+            <a:tailEnd type="triangle"/>
+          </a:ln>
+        </p:spPr>
+        <p:style>
+          <a:lnRef idx="1">
+            <a:schemeClr val="accent1"/>
+          </a:lnRef>
+          <a:fillRef idx="0">
+            <a:schemeClr val="accent1"/>
+          </a:fillRef>
+          <a:effectRef idx="0">
+            <a:schemeClr val="accent1"/>
+          </a:effectRef>
+          <a:fontRef idx="minor">
+            <a:schemeClr val="tx1"/>
+          </a:fontRef>
+        </p:style>
+      </p:cxnSp>
+      <p:cxnSp>
+        <p:nvCxnSpPr>
+          <p:cNvPr id="75" name="Straight Arrow Connector 74"/>
+          <p:cNvCxnSpPr>
+            <a:stCxn id="54" idx="0"/>
+            <a:endCxn id="59" idx="4"/>
+          </p:cNvCxnSpPr>
+          <p:nvPr/>
+        </p:nvCxnSpPr>
+        <p:spPr>
+          <a:xfrm flipH="1" flipV="1">
+            <a:off x="4915593" y="6505206"/>
+            <a:ext cx="1" cy="330338"/>
+          </a:xfrm>
+          <a:prstGeom prst="straightConnector1">
+            <a:avLst/>
+          </a:prstGeom>
+          <a:ln w="38100">
+            <a:solidFill>
+              <a:schemeClr val="tx1"/>
+            </a:solidFill>
+            <a:tailEnd type="triangle"/>
+          </a:ln>
+        </p:spPr>
+        <p:style>
+          <a:lnRef idx="1">
+            <a:schemeClr val="accent1"/>
+          </a:lnRef>
+          <a:fillRef idx="0">
+            <a:schemeClr val="accent1"/>
+          </a:fillRef>
+          <a:effectRef idx="0">
+            <a:schemeClr val="accent1"/>
+          </a:effectRef>
+          <a:fontRef idx="minor">
+            <a:schemeClr val="tx1"/>
+          </a:fontRef>
+        </p:style>
+      </p:cxnSp>
+      <p:sp>
+        <p:nvSpPr>
+          <p:cNvPr id="88" name="Oval 87"/>
+          <p:cNvSpPr/>
+          <p:nvPr/>
+        </p:nvSpPr>
+        <p:spPr>
+          <a:xfrm>
+            <a:off x="6452791" y="5845403"/>
+            <a:ext cx="1586333" cy="659803"/>
+          </a:xfrm>
+          <a:prstGeom prst="ellipse">
+            <a:avLst/>
+          </a:prstGeom>
+        </p:spPr>
+        <p:style>
+          <a:lnRef idx="3">
+            <a:schemeClr val="lt1"/>
+          </a:lnRef>
+          <a:fillRef idx="1">
+            <a:schemeClr val="accent2"/>
+          </a:fillRef>
+          <a:effectRef idx="1">
+            <a:schemeClr val="accent2"/>
+          </a:effectRef>
+          <a:fontRef idx="minor">
+            <a:schemeClr val="lt1"/>
+          </a:fontRef>
+        </p:style>
+        <p:txBody>
+          <a:bodyPr rtlCol="0" anchor="ctr"/>
+          <a:lstStyle/>
+          <a:p>
+            <a:pPr algn="ctr"/>
+            <a:r>
+              <a:rPr lang="pt-BR" sz="1492" dirty="0" smtClean="0"/>
+              <a:t>AnkleBot?</a:t>
+            </a:r>
+            <a:endParaRPr lang="pt-BR" sz="1492" dirty="0"/>
+          </a:p>
+        </p:txBody>
+      </p:sp>
+      <p:cxnSp>
+        <p:nvCxnSpPr>
+          <p:cNvPr id="90" name="Elbow Connector 89"/>
+          <p:cNvCxnSpPr>
+            <a:stCxn id="45" idx="3"/>
+            <a:endCxn id="22" idx="5"/>
+          </p:cNvCxnSpPr>
+          <p:nvPr/>
+        </p:nvCxnSpPr>
+        <p:spPr>
+          <a:xfrm rot="5400000" flipH="1">
+            <a:off x="4909556" y="3613725"/>
+            <a:ext cx="12073" cy="3539022"/>
+          </a:xfrm>
+          <a:prstGeom prst="bentConnector3">
+            <a:avLst>
+              <a:gd name="adj1" fmla="val -1972501"/>
+            </a:avLst>
+          </a:prstGeom>
+          <a:ln w="28575">
+            <a:solidFill>
+              <a:schemeClr val="tx1"/>
+            </a:solidFill>
+            <a:tailEnd type="triangle"/>
+          </a:ln>
+        </p:spPr>
+        <p:style>
+          <a:lnRef idx="1">
+            <a:schemeClr val="accent1"/>
+          </a:lnRef>
+          <a:fillRef idx="0">
+            <a:schemeClr val="accent1"/>
+          </a:fillRef>
+          <a:effectRef idx="0">
+            <a:schemeClr val="accent1"/>
+          </a:effectRef>
+          <a:fontRef idx="minor">
+            <a:schemeClr val="tx1"/>
+          </a:fontRef>
+        </p:style>
+      </p:cxnSp>
     </p:spTree>
     <p:extLst>
       <p:ext uri="{BB962C8B-B14F-4D97-AF65-F5344CB8AC3E}">

</xml_diff>

<commit_message>
Cursor represents the member side.
</commit_message>
<xml_diff>
--- a/Script Flow.pptx
+++ b/Script Flow.pptx
@@ -243,7 +243,7 @@
           <a:p>
             <a:fld id="{2E538E35-4A08-48D2-89A5-89C6CF66D327}" type="datetimeFigureOut">
               <a:rPr lang="pt-BR" smtClean="0"/>
-              <a:t>30/04/2017</a:t>
+              <a:t>19/06/2017</a:t>
             </a:fld>
             <a:endParaRPr lang="pt-BR"/>
           </a:p>
@@ -413,7 +413,7 @@
           <a:p>
             <a:fld id="{2E538E35-4A08-48D2-89A5-89C6CF66D327}" type="datetimeFigureOut">
               <a:rPr lang="pt-BR" smtClean="0"/>
-              <a:t>30/04/2017</a:t>
+              <a:t>19/06/2017</a:t>
             </a:fld>
             <a:endParaRPr lang="pt-BR"/>
           </a:p>
@@ -593,7 +593,7 @@
           <a:p>
             <a:fld id="{2E538E35-4A08-48D2-89A5-89C6CF66D327}" type="datetimeFigureOut">
               <a:rPr lang="pt-BR" smtClean="0"/>
-              <a:t>30/04/2017</a:t>
+              <a:t>19/06/2017</a:t>
             </a:fld>
             <a:endParaRPr lang="pt-BR"/>
           </a:p>
@@ -763,7 +763,7 @@
           <a:p>
             <a:fld id="{2E538E35-4A08-48D2-89A5-89C6CF66D327}" type="datetimeFigureOut">
               <a:rPr lang="pt-BR" smtClean="0"/>
-              <a:t>30/04/2017</a:t>
+              <a:t>19/06/2017</a:t>
             </a:fld>
             <a:endParaRPr lang="pt-BR"/>
           </a:p>
@@ -1007,7 +1007,7 @@
           <a:p>
             <a:fld id="{2E538E35-4A08-48D2-89A5-89C6CF66D327}" type="datetimeFigureOut">
               <a:rPr lang="pt-BR" smtClean="0"/>
-              <a:t>30/04/2017</a:t>
+              <a:t>19/06/2017</a:t>
             </a:fld>
             <a:endParaRPr lang="pt-BR"/>
           </a:p>
@@ -1239,7 +1239,7 @@
           <a:p>
             <a:fld id="{2E538E35-4A08-48D2-89A5-89C6CF66D327}" type="datetimeFigureOut">
               <a:rPr lang="pt-BR" smtClean="0"/>
-              <a:t>30/04/2017</a:t>
+              <a:t>19/06/2017</a:t>
             </a:fld>
             <a:endParaRPr lang="pt-BR"/>
           </a:p>
@@ -1606,7 +1606,7 @@
           <a:p>
             <a:fld id="{2E538E35-4A08-48D2-89A5-89C6CF66D327}" type="datetimeFigureOut">
               <a:rPr lang="pt-BR" smtClean="0"/>
-              <a:t>30/04/2017</a:t>
+              <a:t>19/06/2017</a:t>
             </a:fld>
             <a:endParaRPr lang="pt-BR"/>
           </a:p>
@@ -1724,7 +1724,7 @@
           <a:p>
             <a:fld id="{2E538E35-4A08-48D2-89A5-89C6CF66D327}" type="datetimeFigureOut">
               <a:rPr lang="pt-BR" smtClean="0"/>
-              <a:t>30/04/2017</a:t>
+              <a:t>19/06/2017</a:t>
             </a:fld>
             <a:endParaRPr lang="pt-BR"/>
           </a:p>
@@ -1819,7 +1819,7 @@
           <a:p>
             <a:fld id="{2E538E35-4A08-48D2-89A5-89C6CF66D327}" type="datetimeFigureOut">
               <a:rPr lang="pt-BR" smtClean="0"/>
-              <a:t>30/04/2017</a:t>
+              <a:t>19/06/2017</a:t>
             </a:fld>
             <a:endParaRPr lang="pt-BR"/>
           </a:p>
@@ -2096,7 +2096,7 @@
           <a:p>
             <a:fld id="{2E538E35-4A08-48D2-89A5-89C6CF66D327}" type="datetimeFigureOut">
               <a:rPr lang="pt-BR" smtClean="0"/>
-              <a:t>30/04/2017</a:t>
+              <a:t>19/06/2017</a:t>
             </a:fld>
             <a:endParaRPr lang="pt-BR"/>
           </a:p>
@@ -2353,7 +2353,7 @@
           <a:p>
             <a:fld id="{2E538E35-4A08-48D2-89A5-89C6CF66D327}" type="datetimeFigureOut">
               <a:rPr lang="pt-BR" smtClean="0"/>
-              <a:t>30/04/2017</a:t>
+              <a:t>19/06/2017</a:t>
             </a:fld>
             <a:endParaRPr lang="pt-BR"/>
           </a:p>
@@ -2566,7 +2566,7 @@
           <a:p>
             <a:fld id="{2E538E35-4A08-48D2-89A5-89C6CF66D327}" type="datetimeFigureOut">
               <a:rPr lang="pt-BR" smtClean="0"/>
-              <a:t>30/04/2017</a:t>
+              <a:t>19/06/2017</a:t>
             </a:fld>
             <a:endParaRPr lang="pt-BR"/>
           </a:p>
@@ -4741,6 +4741,47 @@
           </a:fontRef>
         </p:style>
       </p:cxnSp>
+      <p:cxnSp>
+        <p:nvCxnSpPr>
+          <p:cNvPr id="47" name="Elbow Connector 46"/>
+          <p:cNvCxnSpPr>
+            <a:stCxn id="54" idx="2"/>
+            <a:endCxn id="29" idx="6"/>
+          </p:cNvCxnSpPr>
+          <p:nvPr/>
+        </p:nvCxnSpPr>
+        <p:spPr>
+          <a:xfrm rot="10800000">
+            <a:off x="3378395" y="6154686"/>
+            <a:ext cx="744033" cy="1010761"/>
+          </a:xfrm>
+          <a:prstGeom prst="bentConnector3">
+            <a:avLst>
+              <a:gd name="adj1" fmla="val 50000"/>
+            </a:avLst>
+          </a:prstGeom>
+          <a:ln w="28575">
+            <a:solidFill>
+              <a:schemeClr val="tx1"/>
+            </a:solidFill>
+            <a:tailEnd type="triangle"/>
+          </a:ln>
+        </p:spPr>
+        <p:style>
+          <a:lnRef idx="1">
+            <a:schemeClr val="accent1"/>
+          </a:lnRef>
+          <a:fillRef idx="0">
+            <a:schemeClr val="accent1"/>
+          </a:fillRef>
+          <a:effectRef idx="0">
+            <a:schemeClr val="accent1"/>
+          </a:effectRef>
+          <a:fontRef idx="minor">
+            <a:schemeClr val="tx1"/>
+          </a:fontRef>
+        </p:style>
+      </p:cxnSp>
     </p:spTree>
     <p:extLst>
       <p:ext uri="{BB962C8B-B14F-4D97-AF65-F5344CB8AC3E}">

</xml_diff>

<commit_message>
New Class: Ankle Movement Responsible for manage the movement conversion.
</commit_message>
<xml_diff>
--- a/Script Flow.pptx
+++ b/Script Flow.pptx
@@ -244,7 +244,7 @@
           <a:p>
             <a:fld id="{2E538E35-4A08-48D2-89A5-89C6CF66D327}" type="datetimeFigureOut">
               <a:rPr lang="pt-BR" smtClean="0"/>
-              <a:t>26/06/2017</a:t>
+              <a:t>28/06/2017</a:t>
             </a:fld>
             <a:endParaRPr lang="pt-BR"/>
           </a:p>
@@ -414,7 +414,7 @@
           <a:p>
             <a:fld id="{2E538E35-4A08-48D2-89A5-89C6CF66D327}" type="datetimeFigureOut">
               <a:rPr lang="pt-BR" smtClean="0"/>
-              <a:t>26/06/2017</a:t>
+              <a:t>28/06/2017</a:t>
             </a:fld>
             <a:endParaRPr lang="pt-BR"/>
           </a:p>
@@ -594,7 +594,7 @@
           <a:p>
             <a:fld id="{2E538E35-4A08-48D2-89A5-89C6CF66D327}" type="datetimeFigureOut">
               <a:rPr lang="pt-BR" smtClean="0"/>
-              <a:t>26/06/2017</a:t>
+              <a:t>28/06/2017</a:t>
             </a:fld>
             <a:endParaRPr lang="pt-BR"/>
           </a:p>
@@ -764,7 +764,7 @@
           <a:p>
             <a:fld id="{2E538E35-4A08-48D2-89A5-89C6CF66D327}" type="datetimeFigureOut">
               <a:rPr lang="pt-BR" smtClean="0"/>
-              <a:t>26/06/2017</a:t>
+              <a:t>28/06/2017</a:t>
             </a:fld>
             <a:endParaRPr lang="pt-BR"/>
           </a:p>
@@ -1008,7 +1008,7 @@
           <a:p>
             <a:fld id="{2E538E35-4A08-48D2-89A5-89C6CF66D327}" type="datetimeFigureOut">
               <a:rPr lang="pt-BR" smtClean="0"/>
-              <a:t>26/06/2017</a:t>
+              <a:t>28/06/2017</a:t>
             </a:fld>
             <a:endParaRPr lang="pt-BR"/>
           </a:p>
@@ -1240,7 +1240,7 @@
           <a:p>
             <a:fld id="{2E538E35-4A08-48D2-89A5-89C6CF66D327}" type="datetimeFigureOut">
               <a:rPr lang="pt-BR" smtClean="0"/>
-              <a:t>26/06/2017</a:t>
+              <a:t>28/06/2017</a:t>
             </a:fld>
             <a:endParaRPr lang="pt-BR"/>
           </a:p>
@@ -1607,7 +1607,7 @@
           <a:p>
             <a:fld id="{2E538E35-4A08-48D2-89A5-89C6CF66D327}" type="datetimeFigureOut">
               <a:rPr lang="pt-BR" smtClean="0"/>
-              <a:t>26/06/2017</a:t>
+              <a:t>28/06/2017</a:t>
             </a:fld>
             <a:endParaRPr lang="pt-BR"/>
           </a:p>
@@ -1725,7 +1725,7 @@
           <a:p>
             <a:fld id="{2E538E35-4A08-48D2-89A5-89C6CF66D327}" type="datetimeFigureOut">
               <a:rPr lang="pt-BR" smtClean="0"/>
-              <a:t>26/06/2017</a:t>
+              <a:t>28/06/2017</a:t>
             </a:fld>
             <a:endParaRPr lang="pt-BR"/>
           </a:p>
@@ -1820,7 +1820,7 @@
           <a:p>
             <a:fld id="{2E538E35-4A08-48D2-89A5-89C6CF66D327}" type="datetimeFigureOut">
               <a:rPr lang="pt-BR" smtClean="0"/>
-              <a:t>26/06/2017</a:t>
+              <a:t>28/06/2017</a:t>
             </a:fld>
             <a:endParaRPr lang="pt-BR"/>
           </a:p>
@@ -2097,7 +2097,7 @@
           <a:p>
             <a:fld id="{2E538E35-4A08-48D2-89A5-89C6CF66D327}" type="datetimeFigureOut">
               <a:rPr lang="pt-BR" smtClean="0"/>
-              <a:t>26/06/2017</a:t>
+              <a:t>28/06/2017</a:t>
             </a:fld>
             <a:endParaRPr lang="pt-BR"/>
           </a:p>
@@ -2354,7 +2354,7 @@
           <a:p>
             <a:fld id="{2E538E35-4A08-48D2-89A5-89C6CF66D327}" type="datetimeFigureOut">
               <a:rPr lang="pt-BR" smtClean="0"/>
-              <a:t>26/06/2017</a:t>
+              <a:t>28/06/2017</a:t>
             </a:fld>
             <a:endParaRPr lang="pt-BR"/>
           </a:p>
@@ -2567,7 +2567,7 @@
           <a:p>
             <a:fld id="{2E538E35-4A08-48D2-89A5-89C6CF66D327}" type="datetimeFigureOut">
               <a:rPr lang="pt-BR" smtClean="0"/>
-              <a:t>26/06/2017</a:t>
+              <a:t>28/06/2017</a:t>
             </a:fld>
             <a:endParaRPr lang="pt-BR"/>
           </a:p>
@@ -4619,13 +4619,29 @@
           <a:p>
             <a:pPr algn="ctr"/>
             <a:r>
-              <a:rPr lang="pt-BR" sz="1492" dirty="0">
+              <a:rPr lang="pt-BR" sz="1492" dirty="0" smtClean="0">
                 <a:solidFill>
                   <a:srgbClr val="FF0000"/>
                 </a:solidFill>
               </a:rPr>
-              <a:t>AnkleBot?</a:t>
-            </a:r>
+              <a:t>Ankle</a:t>
+            </a:r>
+          </a:p>
+          <a:p>
+            <a:pPr algn="ctr"/>
+            <a:r>
+              <a:rPr lang="pt-BR" sz="1492" dirty="0" smtClean="0">
+                <a:solidFill>
+                  <a:srgbClr val="FF0000"/>
+                </a:solidFill>
+              </a:rPr>
+              <a:t>Movement?</a:t>
+            </a:r>
+            <a:endParaRPr lang="pt-BR" sz="1492" dirty="0">
+              <a:solidFill>
+                <a:srgbClr val="FF0000"/>
+              </a:solidFill>
+            </a:endParaRPr>
           </a:p>
         </p:txBody>
       </p:sp>

</xml_diff>

<commit_message>
New function: Calibrate Movement Now game must work with robot (need test)
</commit_message>
<xml_diff>
--- a/Script Flow.pptx
+++ b/Script Flow.pptx
@@ -6648,12 +6648,18 @@
         </p:nvSpPr>
         <p:spPr>
           <a:xfrm>
-            <a:off x="12831513" y="3562074"/>
+            <a:off x="7261744" y="2080486"/>
             <a:ext cx="1586333" cy="659803"/>
           </a:xfrm>
           <a:prstGeom prst="ellipse">
             <a:avLst/>
           </a:prstGeom>
+          <a:ln>
+            <a:solidFill>
+              <a:schemeClr val="tx1"/>
+            </a:solidFill>
+            <a:prstDash val="dash"/>
+          </a:ln>
         </p:spPr>
         <p:style>
           <a:lnRef idx="3">
@@ -6675,13 +6681,29 @@
           <a:p>
             <a:pPr algn="ctr"/>
             <a:r>
-              <a:rPr lang="pt-BR" sz="1492" dirty="0">
+              <a:rPr lang="pt-BR" sz="1492" dirty="0" smtClean="0">
                 <a:solidFill>
-                  <a:srgbClr val="FF0000"/>
+                  <a:schemeClr val="bg1"/>
                 </a:solidFill>
               </a:rPr>
-              <a:t>AnkleBot?</a:t>
-            </a:r>
+              <a:t>Ankle</a:t>
+            </a:r>
+          </a:p>
+          <a:p>
+            <a:pPr algn="ctr"/>
+            <a:r>
+              <a:rPr lang="pt-BR" sz="1492" dirty="0" smtClean="0">
+                <a:solidFill>
+                  <a:schemeClr val="bg1"/>
+                </a:solidFill>
+              </a:rPr>
+              <a:t>Movement</a:t>
+            </a:r>
+            <a:endParaRPr lang="pt-BR" sz="1492" dirty="0">
+              <a:solidFill>
+                <a:schemeClr val="bg1"/>
+              </a:solidFill>
+            </a:endParaRPr>
           </a:p>
         </p:txBody>
       </p:sp>
@@ -7630,6 +7652,45 @@
             </a:solidFill>
             <a:headEnd type="triangle" w="med" len="med"/>
             <a:tailEnd type="none" w="med" len="med"/>
+          </a:ln>
+        </p:spPr>
+        <p:style>
+          <a:lnRef idx="1">
+            <a:schemeClr val="accent1"/>
+          </a:lnRef>
+          <a:fillRef idx="0">
+            <a:schemeClr val="accent1"/>
+          </a:fillRef>
+          <a:effectRef idx="0">
+            <a:schemeClr val="accent1"/>
+          </a:effectRef>
+          <a:fontRef idx="minor">
+            <a:schemeClr val="tx1"/>
+          </a:fontRef>
+        </p:style>
+      </p:cxnSp>
+      <p:cxnSp>
+        <p:nvCxnSpPr>
+          <p:cNvPr id="60" name="Straight Arrow Connector 59"/>
+          <p:cNvCxnSpPr>
+            <a:stCxn id="20" idx="7"/>
+            <a:endCxn id="88" idx="4"/>
+          </p:cNvCxnSpPr>
+          <p:nvPr/>
+        </p:nvCxnSpPr>
+        <p:spPr>
+          <a:xfrm flipV="1">
+            <a:off x="7922855" y="2740289"/>
+            <a:ext cx="132056" cy="659803"/>
+          </a:xfrm>
+          <a:prstGeom prst="straightConnector1">
+            <a:avLst/>
+          </a:prstGeom>
+          <a:ln w="38100">
+            <a:solidFill>
+              <a:schemeClr val="tx1"/>
+            </a:solidFill>
+            <a:tailEnd type="triangle"/>
           </a:ln>
         </p:spPr>
         <p:style>

</xml_diff>

<commit_message>
New function: Log now loges the final result for each player. Bug fixed: Game now does not allow to restart the game before finishing the motion.
</commit_message>
<xml_diff>
--- a/Script Flow.pptx
+++ b/Script Flow.pptx
@@ -2980,7 +2980,7 @@
         </p:nvSpPr>
         <p:spPr>
           <a:xfrm>
-            <a:off x="4626959" y="2862166"/>
+            <a:off x="4692543" y="2679675"/>
             <a:ext cx="1586333" cy="659803"/>
           </a:xfrm>
           <a:prstGeom prst="ellipse">
@@ -3201,7 +3201,7 @@
         </p:nvSpPr>
         <p:spPr>
           <a:xfrm>
-            <a:off x="6574453" y="483220"/>
+            <a:off x="1655569" y="127654"/>
             <a:ext cx="1586333" cy="659803"/>
           </a:xfrm>
           <a:prstGeom prst="ellipse">
@@ -3246,7 +3246,7 @@
         </p:nvSpPr>
         <p:spPr>
           <a:xfrm>
-            <a:off x="1446681" y="112192"/>
+            <a:off x="1856482" y="2661527"/>
             <a:ext cx="1586333" cy="659803"/>
           </a:xfrm>
           <a:prstGeom prst="ellipse">
@@ -3592,7 +3592,7 @@
         <p:spPr>
           <a:xfrm>
             <a:off x="5312316" y="1101897"/>
-            <a:ext cx="107810" cy="1760269"/>
+            <a:ext cx="173394" cy="1577778"/>
           </a:xfrm>
           <a:prstGeom prst="straightConnector1">
             <a:avLst/>
@@ -3882,7 +3882,7 @@
         <p:spPr>
           <a:xfrm>
             <a:off x="793167" y="1648260"/>
-            <a:ext cx="3833792" cy="1543808"/>
+            <a:ext cx="3899376" cy="1361317"/>
           </a:xfrm>
           <a:prstGeom prst="straightConnector1">
             <a:avLst/>
@@ -4375,15 +4375,15 @@
         <p:nvCxnSpPr>
           <p:cNvPr id="67" name="Straight Arrow Connector 66"/>
           <p:cNvCxnSpPr>
-            <a:stCxn id="21" idx="6"/>
+            <a:stCxn id="26" idx="7"/>
             <a:endCxn id="23" idx="2"/>
           </p:cNvCxnSpPr>
           <p:nvPr/>
         </p:nvCxnSpPr>
         <p:spPr>
-          <a:xfrm>
-            <a:off x="6105482" y="771996"/>
-            <a:ext cx="468971" cy="41126"/>
+          <a:xfrm flipV="1">
+            <a:off x="1354020" y="457556"/>
+            <a:ext cx="301549" cy="627527"/>
           </a:xfrm>
           <a:prstGeom prst="straightConnector1">
             <a:avLst/>
@@ -4684,8 +4684,8 @@
         </p:nvCxnSpPr>
         <p:spPr>
           <a:xfrm flipV="1">
-            <a:off x="3210502" y="3425343"/>
-            <a:ext cx="1648770" cy="228576"/>
+            <a:off x="3210502" y="3242852"/>
+            <a:ext cx="1714354" cy="411067"/>
           </a:xfrm>
           <a:prstGeom prst="straightConnector1">
             <a:avLst/>
@@ -4717,15 +4717,15 @@
         <p:nvCxnSpPr>
           <p:cNvPr id="109" name="Straight Arrow Connector 108"/>
           <p:cNvCxnSpPr>
-            <a:stCxn id="26" idx="7"/>
-            <a:endCxn id="24" idx="3"/>
+            <a:stCxn id="26" idx="4"/>
+            <a:endCxn id="24" idx="1"/>
           </p:cNvCxnSpPr>
           <p:nvPr/>
         </p:nvCxnSpPr>
         <p:spPr>
-          <a:xfrm flipV="1">
-            <a:off x="1354020" y="675369"/>
-            <a:ext cx="324974" cy="409714"/>
+          <a:xfrm>
+            <a:off x="793167" y="1648260"/>
+            <a:ext cx="1295628" cy="1109893"/>
           </a:xfrm>
           <a:prstGeom prst="straightConnector1">
             <a:avLst/>
@@ -4764,7 +4764,7 @@
         <p:spPr>
           <a:xfrm flipH="1" flipV="1">
             <a:off x="4374525" y="2464209"/>
-            <a:ext cx="484747" cy="494583"/>
+            <a:ext cx="550331" cy="312092"/>
           </a:xfrm>
           <a:prstGeom prst="straightConnector1">
             <a:avLst/>
@@ -5079,8 +5079,8 @@
         </p:nvCxnSpPr>
         <p:spPr>
           <a:xfrm flipH="1" flipV="1">
-            <a:off x="5420126" y="3521969"/>
-            <a:ext cx="194181" cy="2345417"/>
+            <a:off x="5485710" y="3339478"/>
+            <a:ext cx="128597" cy="2527908"/>
           </a:xfrm>
           <a:prstGeom prst="straightConnector1">
             <a:avLst/>
@@ -5345,6 +5345,87 @@
             <a:avLst/>
           </a:prstGeom>
           <a:ln w="28575">
+            <a:solidFill>
+              <a:schemeClr val="bg1">
+                <a:lumMod val="50000"/>
+              </a:schemeClr>
+            </a:solidFill>
+            <a:tailEnd type="triangle"/>
+          </a:ln>
+        </p:spPr>
+        <p:style>
+          <a:lnRef idx="1">
+            <a:schemeClr val="accent1"/>
+          </a:lnRef>
+          <a:fillRef idx="0">
+            <a:schemeClr val="accent1"/>
+          </a:fillRef>
+          <a:effectRef idx="0">
+            <a:schemeClr val="accent1"/>
+          </a:effectRef>
+          <a:fontRef idx="minor">
+            <a:schemeClr val="tx1"/>
+          </a:fontRef>
+        </p:style>
+      </p:cxnSp>
+      <p:cxnSp>
+        <p:nvCxnSpPr>
+          <p:cNvPr id="61" name="Straight Arrow Connector 60"/>
+          <p:cNvCxnSpPr>
+            <a:stCxn id="24" idx="6"/>
+            <a:endCxn id="18" idx="2"/>
+          </p:cNvCxnSpPr>
+          <p:nvPr/>
+        </p:nvCxnSpPr>
+        <p:spPr>
+          <a:xfrm>
+            <a:off x="3442815" y="2991429"/>
+            <a:ext cx="1249728" cy="18148"/>
+          </a:xfrm>
+          <a:prstGeom prst="straightConnector1">
+            <a:avLst/>
+          </a:prstGeom>
+          <a:ln w="38100">
+            <a:solidFill>
+              <a:srgbClr val="00B0F0"/>
+            </a:solidFill>
+            <a:prstDash val="sysDash"/>
+            <a:tailEnd type="triangle"/>
+          </a:ln>
+        </p:spPr>
+        <p:style>
+          <a:lnRef idx="1">
+            <a:schemeClr val="accent1"/>
+          </a:lnRef>
+          <a:fillRef idx="0">
+            <a:schemeClr val="accent1"/>
+          </a:fillRef>
+          <a:effectRef idx="0">
+            <a:schemeClr val="accent1"/>
+          </a:effectRef>
+          <a:fontRef idx="minor">
+            <a:schemeClr val="tx1"/>
+          </a:fontRef>
+        </p:style>
+      </p:cxnSp>
+      <p:cxnSp>
+        <p:nvCxnSpPr>
+          <p:cNvPr id="70" name="Straight Arrow Connector 69"/>
+          <p:cNvCxnSpPr>
+            <a:stCxn id="24" idx="5"/>
+            <a:endCxn id="20" idx="2"/>
+          </p:cNvCxnSpPr>
+          <p:nvPr/>
+        </p:nvCxnSpPr>
+        <p:spPr>
+          <a:xfrm>
+            <a:off x="3210502" y="3224704"/>
+            <a:ext cx="3358333" cy="408664"/>
+          </a:xfrm>
+          <a:prstGeom prst="straightConnector1">
+            <a:avLst/>
+          </a:prstGeom>
+          <a:ln w="38100">
             <a:solidFill>
               <a:schemeClr val="bg1">
                 <a:lumMod val="50000"/>

</xml_diff>

<commit_message>
New Interface: Mini Map Bug Fixed: Elipse to Square and Circle - Ankle Movement near 90 or 270 degree. Logger does not register historic without choices.
</commit_message>
<xml_diff>
--- a/Script Flow.pptx
+++ b/Script Flow.pptx
@@ -244,7 +244,7 @@
           <a:p>
             <a:fld id="{2E538E35-4A08-48D2-89A5-89C6CF66D327}" type="datetimeFigureOut">
               <a:rPr lang="pt-BR" smtClean="0"/>
-              <a:t>29/06/2017</a:t>
+              <a:t>30/06/2017</a:t>
             </a:fld>
             <a:endParaRPr lang="pt-BR"/>
           </a:p>
@@ -414,7 +414,7 @@
           <a:p>
             <a:fld id="{2E538E35-4A08-48D2-89A5-89C6CF66D327}" type="datetimeFigureOut">
               <a:rPr lang="pt-BR" smtClean="0"/>
-              <a:t>29/06/2017</a:t>
+              <a:t>30/06/2017</a:t>
             </a:fld>
             <a:endParaRPr lang="pt-BR"/>
           </a:p>
@@ -594,7 +594,7 @@
           <a:p>
             <a:fld id="{2E538E35-4A08-48D2-89A5-89C6CF66D327}" type="datetimeFigureOut">
               <a:rPr lang="pt-BR" smtClean="0"/>
-              <a:t>29/06/2017</a:t>
+              <a:t>30/06/2017</a:t>
             </a:fld>
             <a:endParaRPr lang="pt-BR"/>
           </a:p>
@@ -764,7 +764,7 @@
           <a:p>
             <a:fld id="{2E538E35-4A08-48D2-89A5-89C6CF66D327}" type="datetimeFigureOut">
               <a:rPr lang="pt-BR" smtClean="0"/>
-              <a:t>29/06/2017</a:t>
+              <a:t>30/06/2017</a:t>
             </a:fld>
             <a:endParaRPr lang="pt-BR"/>
           </a:p>
@@ -1008,7 +1008,7 @@
           <a:p>
             <a:fld id="{2E538E35-4A08-48D2-89A5-89C6CF66D327}" type="datetimeFigureOut">
               <a:rPr lang="pt-BR" smtClean="0"/>
-              <a:t>29/06/2017</a:t>
+              <a:t>30/06/2017</a:t>
             </a:fld>
             <a:endParaRPr lang="pt-BR"/>
           </a:p>
@@ -1240,7 +1240,7 @@
           <a:p>
             <a:fld id="{2E538E35-4A08-48D2-89A5-89C6CF66D327}" type="datetimeFigureOut">
               <a:rPr lang="pt-BR" smtClean="0"/>
-              <a:t>29/06/2017</a:t>
+              <a:t>30/06/2017</a:t>
             </a:fld>
             <a:endParaRPr lang="pt-BR"/>
           </a:p>
@@ -1607,7 +1607,7 @@
           <a:p>
             <a:fld id="{2E538E35-4A08-48D2-89A5-89C6CF66D327}" type="datetimeFigureOut">
               <a:rPr lang="pt-BR" smtClean="0"/>
-              <a:t>29/06/2017</a:t>
+              <a:t>30/06/2017</a:t>
             </a:fld>
             <a:endParaRPr lang="pt-BR"/>
           </a:p>
@@ -1725,7 +1725,7 @@
           <a:p>
             <a:fld id="{2E538E35-4A08-48D2-89A5-89C6CF66D327}" type="datetimeFigureOut">
               <a:rPr lang="pt-BR" smtClean="0"/>
-              <a:t>29/06/2017</a:t>
+              <a:t>30/06/2017</a:t>
             </a:fld>
             <a:endParaRPr lang="pt-BR"/>
           </a:p>
@@ -1820,7 +1820,7 @@
           <a:p>
             <a:fld id="{2E538E35-4A08-48D2-89A5-89C6CF66D327}" type="datetimeFigureOut">
               <a:rPr lang="pt-BR" smtClean="0"/>
-              <a:t>29/06/2017</a:t>
+              <a:t>30/06/2017</a:t>
             </a:fld>
             <a:endParaRPr lang="pt-BR"/>
           </a:p>
@@ -2097,7 +2097,7 @@
           <a:p>
             <a:fld id="{2E538E35-4A08-48D2-89A5-89C6CF66D327}" type="datetimeFigureOut">
               <a:rPr lang="pt-BR" smtClean="0"/>
-              <a:t>29/06/2017</a:t>
+              <a:t>30/06/2017</a:t>
             </a:fld>
             <a:endParaRPr lang="pt-BR"/>
           </a:p>
@@ -2354,7 +2354,7 @@
           <a:p>
             <a:fld id="{2E538E35-4A08-48D2-89A5-89C6CF66D327}" type="datetimeFigureOut">
               <a:rPr lang="pt-BR" smtClean="0"/>
-              <a:t>29/06/2017</a:t>
+              <a:t>30/06/2017</a:t>
             </a:fld>
             <a:endParaRPr lang="pt-BR"/>
           </a:p>
@@ -2567,7 +2567,7 @@
           <a:p>
             <a:fld id="{2E538E35-4A08-48D2-89A5-89C6CF66D327}" type="datetimeFigureOut">
               <a:rPr lang="pt-BR" smtClean="0"/>
-              <a:t>29/06/2017</a:t>
+              <a:t>30/06/2017</a:t>
             </a:fld>
             <a:endParaRPr lang="pt-BR"/>
           </a:p>
@@ -4326,51 +4326,6 @@
           </a:p>
         </p:txBody>
       </p:sp>
-      <p:sp>
-        <p:nvSpPr>
-          <p:cNvPr id="66" name="Oval 65"/>
-          <p:cNvSpPr/>
-          <p:nvPr/>
-        </p:nvSpPr>
-        <p:spPr>
-          <a:xfrm>
-            <a:off x="9688368" y="2107684"/>
-            <a:ext cx="1586333" cy="659803"/>
-          </a:xfrm>
-          <a:prstGeom prst="ellipse">
-            <a:avLst/>
-          </a:prstGeom>
-        </p:spPr>
-        <p:style>
-          <a:lnRef idx="3">
-            <a:schemeClr val="lt1"/>
-          </a:lnRef>
-          <a:fillRef idx="1">
-            <a:schemeClr val="accent2"/>
-          </a:fillRef>
-          <a:effectRef idx="1">
-            <a:schemeClr val="accent2"/>
-          </a:effectRef>
-          <a:fontRef idx="minor">
-            <a:schemeClr val="lt1"/>
-          </a:fontRef>
-        </p:style>
-        <p:txBody>
-          <a:bodyPr rtlCol="0" anchor="ctr"/>
-          <a:lstStyle/>
-          <a:p>
-            <a:pPr algn="ctr"/>
-            <a:r>
-              <a:rPr lang="pt-BR" sz="1492" dirty="0">
-                <a:solidFill>
-                  <a:srgbClr val="FF0000"/>
-                </a:solidFill>
-              </a:rPr>
-              <a:t>Data Manager</a:t>
-            </a:r>
-          </a:p>
-        </p:txBody>
-      </p:sp>
       <p:cxnSp>
         <p:nvCxnSpPr>
           <p:cNvPr id="67" name="Straight Arrow Connector 66"/>
@@ -5421,6 +5376,141 @@
           <a:xfrm>
             <a:off x="3210502" y="3224704"/>
             <a:ext cx="3358333" cy="408664"/>
+          </a:xfrm>
+          <a:prstGeom prst="straightConnector1">
+            <a:avLst/>
+          </a:prstGeom>
+          <a:ln w="38100">
+            <a:solidFill>
+              <a:schemeClr val="bg1">
+                <a:lumMod val="50000"/>
+              </a:schemeClr>
+            </a:solidFill>
+            <a:tailEnd type="triangle"/>
+          </a:ln>
+        </p:spPr>
+        <p:style>
+          <a:lnRef idx="1">
+            <a:schemeClr val="accent1"/>
+          </a:lnRef>
+          <a:fillRef idx="0">
+            <a:schemeClr val="accent1"/>
+          </a:fillRef>
+          <a:effectRef idx="0">
+            <a:schemeClr val="accent1"/>
+          </a:effectRef>
+          <a:fontRef idx="minor">
+            <a:schemeClr val="tx1"/>
+          </a:fontRef>
+        </p:style>
+      </p:cxnSp>
+      <p:sp>
+        <p:nvSpPr>
+          <p:cNvPr id="63" name="Oval 62"/>
+          <p:cNvSpPr/>
+          <p:nvPr/>
+        </p:nvSpPr>
+        <p:spPr>
+          <a:xfrm>
+            <a:off x="1191912" y="4871687"/>
+            <a:ext cx="1586333" cy="659803"/>
+          </a:xfrm>
+          <a:prstGeom prst="ellipse">
+            <a:avLst/>
+          </a:prstGeom>
+          <a:ln w="28575">
+            <a:solidFill>
+              <a:schemeClr val="tx1"/>
+            </a:solidFill>
+            <a:prstDash val="dash"/>
+          </a:ln>
+        </p:spPr>
+        <p:style>
+          <a:lnRef idx="1">
+            <a:schemeClr val="accent2"/>
+          </a:lnRef>
+          <a:fillRef idx="2">
+            <a:schemeClr val="accent2"/>
+          </a:fillRef>
+          <a:effectRef idx="1">
+            <a:schemeClr val="accent2"/>
+          </a:effectRef>
+          <a:fontRef idx="minor">
+            <a:schemeClr val="dk1"/>
+          </a:fontRef>
+        </p:style>
+        <p:txBody>
+          <a:bodyPr rtlCol="0" anchor="ctr"/>
+          <a:lstStyle/>
+          <a:p>
+            <a:pPr algn="ctr"/>
+            <a:r>
+              <a:rPr lang="pt-BR" sz="1492" dirty="0" smtClean="0"/>
+              <a:t>Mini</a:t>
+            </a:r>
+          </a:p>
+          <a:p>
+            <a:pPr algn="ctr"/>
+            <a:r>
+              <a:rPr lang="pt-BR" sz="1492" dirty="0" smtClean="0"/>
+              <a:t>Map</a:t>
+            </a:r>
+            <a:endParaRPr lang="pt-BR" sz="1492" dirty="0"/>
+          </a:p>
+        </p:txBody>
+      </p:sp>
+      <p:cxnSp>
+        <p:nvCxnSpPr>
+          <p:cNvPr id="64" name="Straight Arrow Connector 63"/>
+          <p:cNvCxnSpPr>
+            <a:stCxn id="38" idx="3"/>
+            <a:endCxn id="63" idx="0"/>
+          </p:cNvCxnSpPr>
+          <p:nvPr/>
+        </p:nvCxnSpPr>
+        <p:spPr>
+          <a:xfrm flipH="1">
+            <a:off x="1985079" y="4120470"/>
+            <a:ext cx="103716" cy="751217"/>
+          </a:xfrm>
+          <a:prstGeom prst="straightConnector1">
+            <a:avLst/>
+          </a:prstGeom>
+          <a:ln w="38100">
+            <a:solidFill>
+              <a:schemeClr val="tx1"/>
+            </a:solidFill>
+            <a:tailEnd type="triangle"/>
+          </a:ln>
+        </p:spPr>
+        <p:style>
+          <a:lnRef idx="1">
+            <a:schemeClr val="accent1"/>
+          </a:lnRef>
+          <a:fillRef idx="0">
+            <a:schemeClr val="accent1"/>
+          </a:fillRef>
+          <a:effectRef idx="0">
+            <a:schemeClr val="accent1"/>
+          </a:effectRef>
+          <a:fontRef idx="minor">
+            <a:schemeClr val="tx1"/>
+          </a:fontRef>
+        </p:style>
+      </p:cxnSp>
+      <p:cxnSp>
+        <p:nvCxnSpPr>
+          <p:cNvPr id="72" name="Straight Arrow Connector 71"/>
+          <p:cNvCxnSpPr>
+            <a:stCxn id="63" idx="7"/>
+            <a:endCxn id="20" idx="3"/>
+          </p:cNvCxnSpPr>
+          <p:nvPr/>
+        </p:nvCxnSpPr>
+        <p:spPr>
+          <a:xfrm flipV="1">
+            <a:off x="2545932" y="3866643"/>
+            <a:ext cx="4255216" cy="1101670"/>
           </a:xfrm>
           <a:prstGeom prst="straightConnector1">
             <a:avLst/>

</xml_diff>

<commit_message>
Force Control in development.
</commit_message>
<xml_diff>
--- a/Script Flow.pptx
+++ b/Script Flow.pptx
@@ -244,7 +244,7 @@
           <a:p>
             <a:fld id="{2E538E35-4A08-48D2-89A5-89C6CF66D327}" type="datetimeFigureOut">
               <a:rPr lang="pt-BR" smtClean="0"/>
-              <a:t>30/06/2017</a:t>
+              <a:t>12/09/2017</a:t>
             </a:fld>
             <a:endParaRPr lang="pt-BR"/>
           </a:p>
@@ -414,7 +414,7 @@
           <a:p>
             <a:fld id="{2E538E35-4A08-48D2-89A5-89C6CF66D327}" type="datetimeFigureOut">
               <a:rPr lang="pt-BR" smtClean="0"/>
-              <a:t>30/06/2017</a:t>
+              <a:t>12/09/2017</a:t>
             </a:fld>
             <a:endParaRPr lang="pt-BR"/>
           </a:p>
@@ -594,7 +594,7 @@
           <a:p>
             <a:fld id="{2E538E35-4A08-48D2-89A5-89C6CF66D327}" type="datetimeFigureOut">
               <a:rPr lang="pt-BR" smtClean="0"/>
-              <a:t>30/06/2017</a:t>
+              <a:t>12/09/2017</a:t>
             </a:fld>
             <a:endParaRPr lang="pt-BR"/>
           </a:p>
@@ -764,7 +764,7 @@
           <a:p>
             <a:fld id="{2E538E35-4A08-48D2-89A5-89C6CF66D327}" type="datetimeFigureOut">
               <a:rPr lang="pt-BR" smtClean="0"/>
-              <a:t>30/06/2017</a:t>
+              <a:t>12/09/2017</a:t>
             </a:fld>
             <a:endParaRPr lang="pt-BR"/>
           </a:p>
@@ -1008,7 +1008,7 @@
           <a:p>
             <a:fld id="{2E538E35-4A08-48D2-89A5-89C6CF66D327}" type="datetimeFigureOut">
               <a:rPr lang="pt-BR" smtClean="0"/>
-              <a:t>30/06/2017</a:t>
+              <a:t>12/09/2017</a:t>
             </a:fld>
             <a:endParaRPr lang="pt-BR"/>
           </a:p>
@@ -1240,7 +1240,7 @@
           <a:p>
             <a:fld id="{2E538E35-4A08-48D2-89A5-89C6CF66D327}" type="datetimeFigureOut">
               <a:rPr lang="pt-BR" smtClean="0"/>
-              <a:t>30/06/2017</a:t>
+              <a:t>12/09/2017</a:t>
             </a:fld>
             <a:endParaRPr lang="pt-BR"/>
           </a:p>
@@ -1607,7 +1607,7 @@
           <a:p>
             <a:fld id="{2E538E35-4A08-48D2-89A5-89C6CF66D327}" type="datetimeFigureOut">
               <a:rPr lang="pt-BR" smtClean="0"/>
-              <a:t>30/06/2017</a:t>
+              <a:t>12/09/2017</a:t>
             </a:fld>
             <a:endParaRPr lang="pt-BR"/>
           </a:p>
@@ -1725,7 +1725,7 @@
           <a:p>
             <a:fld id="{2E538E35-4A08-48D2-89A5-89C6CF66D327}" type="datetimeFigureOut">
               <a:rPr lang="pt-BR" smtClean="0"/>
-              <a:t>30/06/2017</a:t>
+              <a:t>12/09/2017</a:t>
             </a:fld>
             <a:endParaRPr lang="pt-BR"/>
           </a:p>
@@ -1820,7 +1820,7 @@
           <a:p>
             <a:fld id="{2E538E35-4A08-48D2-89A5-89C6CF66D327}" type="datetimeFigureOut">
               <a:rPr lang="pt-BR" smtClean="0"/>
-              <a:t>30/06/2017</a:t>
+              <a:t>12/09/2017</a:t>
             </a:fld>
             <a:endParaRPr lang="pt-BR"/>
           </a:p>
@@ -2097,7 +2097,7 @@
           <a:p>
             <a:fld id="{2E538E35-4A08-48D2-89A5-89C6CF66D327}" type="datetimeFigureOut">
               <a:rPr lang="pt-BR" smtClean="0"/>
-              <a:t>30/06/2017</a:t>
+              <a:t>12/09/2017</a:t>
             </a:fld>
             <a:endParaRPr lang="pt-BR"/>
           </a:p>
@@ -2354,7 +2354,7 @@
           <a:p>
             <a:fld id="{2E538E35-4A08-48D2-89A5-89C6CF66D327}" type="datetimeFigureOut">
               <a:rPr lang="pt-BR" smtClean="0"/>
-              <a:t>30/06/2017</a:t>
+              <a:t>12/09/2017</a:t>
             </a:fld>
             <a:endParaRPr lang="pt-BR"/>
           </a:p>
@@ -2567,7 +2567,7 @@
           <a:p>
             <a:fld id="{2E538E35-4A08-48D2-89A5-89C6CF66D327}" type="datetimeFigureOut">
               <a:rPr lang="pt-BR" smtClean="0"/>
-              <a:t>30/06/2017</a:t>
+              <a:t>12/09/2017</a:t>
             </a:fld>
             <a:endParaRPr lang="pt-BR"/>
           </a:p>
@@ -3340,7 +3340,10 @@
           </a:prstGeom>
           <a:ln w="28575">
             <a:solidFill>
-              <a:schemeClr val="tx1"/>
+              <a:schemeClr val="tx1">
+                <a:lumMod val="50000"/>
+                <a:lumOff val="50000"/>
+              </a:schemeClr>
             </a:solidFill>
             <a:prstDash val="dash"/>
           </a:ln>

</xml_diff>